<commit_message>
Pagina Menu Inicio Commit
</commit_message>
<xml_diff>
--- a/Prototipo.pptx
+++ b/Prototipo.pptx
@@ -163,7 +163,7 @@
           <a:noFill/>
           <a:extLst>
             <a:ext uri="{909E8E84-426E-40dd-AFC4-6F175D3DCCD1}">
-              <a14:hiddenFill xmlns:a14="http://schemas.microsoft.com/office/drawing/2010/main" xmlns="">
+              <a14:hiddenFill xmlns="" xmlns:a14="http://schemas.microsoft.com/office/drawing/2010/main">
                 <a:solidFill>
                   <a:srgbClr val="FFFFFF"/>
                 </a:solidFill>
@@ -223,7 +223,7 @@
             </a:ln>
             <a:extLst>
               <a:ext uri="{91240B29-F687-4f45-9708-019B960494DF}">
-                <a14:hiddenLine xmlns:a14="http://schemas.microsoft.com/office/drawing/2010/main" xmlns="" w="9525">
+                <a14:hiddenLine xmlns="" xmlns:a14="http://schemas.microsoft.com/office/drawing/2010/main" w="9525">
                   <a:solidFill>
                     <a:srgbClr val="000000"/>
                   </a:solidFill>
@@ -313,7 +313,7 @@
             </a:ln>
             <a:extLst>
               <a:ext uri="{91240B29-F687-4f45-9708-019B960494DF}">
-                <a14:hiddenLine xmlns:a14="http://schemas.microsoft.com/office/drawing/2010/main" xmlns="" w="9525">
+                <a14:hiddenLine xmlns="" xmlns:a14="http://schemas.microsoft.com/office/drawing/2010/main" w="9525">
                   <a:solidFill>
                     <a:srgbClr val="000000"/>
                   </a:solidFill>
@@ -403,7 +403,7 @@
             </a:ln>
             <a:extLst>
               <a:ext uri="{91240B29-F687-4f45-9708-019B960494DF}">
-                <a14:hiddenLine xmlns:a14="http://schemas.microsoft.com/office/drawing/2010/main" xmlns="" w="9525">
+                <a14:hiddenLine xmlns="" xmlns:a14="http://schemas.microsoft.com/office/drawing/2010/main" w="9525">
                   <a:solidFill>
                     <a:srgbClr val="000000"/>
                   </a:solidFill>
@@ -437,7 +437,7 @@
             </a:ln>
             <a:extLst>
               <a:ext uri="{91240B29-F687-4f45-9708-019B960494DF}">
-                <a14:hiddenLine xmlns:a14="http://schemas.microsoft.com/office/drawing/2010/main" xmlns="" w="9525">
+                <a14:hiddenLine xmlns="" xmlns:a14="http://schemas.microsoft.com/office/drawing/2010/main" w="9525">
                   <a:solidFill>
                     <a:srgbClr val="000000"/>
                   </a:solidFill>
@@ -527,7 +527,7 @@
             </a:ln>
             <a:extLst>
               <a:ext uri="{91240B29-F687-4f45-9708-019B960494DF}">
-                <a14:hiddenLine xmlns:a14="http://schemas.microsoft.com/office/drawing/2010/main" xmlns="" w="9525">
+                <a14:hiddenLine xmlns="" xmlns:a14="http://schemas.microsoft.com/office/drawing/2010/main" w="9525">
                   <a:solidFill>
                     <a:srgbClr val="000000"/>
                   </a:solidFill>
@@ -589,7 +589,7 @@
             </a:ln>
             <a:extLst>
               <a:ext uri="{91240B29-F687-4f45-9708-019B960494DF}">
-                <a14:hiddenLine xmlns:a14="http://schemas.microsoft.com/office/drawing/2010/main" xmlns="" w="9525">
+                <a14:hiddenLine xmlns="" xmlns:a14="http://schemas.microsoft.com/office/drawing/2010/main" w="9525">
                   <a:solidFill>
                     <a:srgbClr val="000000"/>
                   </a:solidFill>
@@ -651,7 +651,7 @@
             </a:ln>
             <a:extLst>
               <a:ext uri="{91240B29-F687-4f45-9708-019B960494DF}">
-                <a14:hiddenLine xmlns:a14="http://schemas.microsoft.com/office/drawing/2010/main" xmlns="" w="9525">
+                <a14:hiddenLine xmlns="" xmlns:a14="http://schemas.microsoft.com/office/drawing/2010/main" w="9525">
                   <a:solidFill>
                     <a:srgbClr val="000000"/>
                   </a:solidFill>
@@ -741,7 +741,7 @@
             </a:ln>
             <a:extLst>
               <a:ext uri="{91240B29-F687-4f45-9708-019B960494DF}">
-                <a14:hiddenLine xmlns:a14="http://schemas.microsoft.com/office/drawing/2010/main" xmlns="" w="9525">
+                <a14:hiddenLine xmlns="" xmlns:a14="http://schemas.microsoft.com/office/drawing/2010/main" w="9525">
                   <a:solidFill>
                     <a:srgbClr val="000000"/>
                   </a:solidFill>
@@ -803,7 +803,7 @@
             </a:ln>
             <a:extLst>
               <a:ext uri="{91240B29-F687-4f45-9708-019B960494DF}">
-                <a14:hiddenLine xmlns:a14="http://schemas.microsoft.com/office/drawing/2010/main" xmlns="" w="9525">
+                <a14:hiddenLine xmlns="" xmlns:a14="http://schemas.microsoft.com/office/drawing/2010/main" w="9525">
                   <a:solidFill>
                     <a:srgbClr val="000000"/>
                   </a:solidFill>
@@ -865,7 +865,7 @@
             </a:ln>
             <a:extLst>
               <a:ext uri="{91240B29-F687-4f45-9708-019B960494DF}">
-                <a14:hiddenLine xmlns:a14="http://schemas.microsoft.com/office/drawing/2010/main" xmlns="" w="9525">
+                <a14:hiddenLine xmlns="" xmlns:a14="http://schemas.microsoft.com/office/drawing/2010/main" w="9525">
                   <a:solidFill>
                     <a:srgbClr val="000000"/>
                   </a:solidFill>
@@ -955,7 +955,7 @@
             </a:ln>
             <a:extLst>
               <a:ext uri="{91240B29-F687-4f45-9708-019B960494DF}">
-                <a14:hiddenLine xmlns:a14="http://schemas.microsoft.com/office/drawing/2010/main" xmlns="" w="9525">
+                <a14:hiddenLine xmlns="" xmlns:a14="http://schemas.microsoft.com/office/drawing/2010/main" w="9525">
                   <a:solidFill>
                     <a:srgbClr val="000000"/>
                   </a:solidFill>
@@ -1045,7 +1045,7 @@
             </a:ln>
             <a:extLst>
               <a:ext uri="{91240B29-F687-4f45-9708-019B960494DF}">
-                <a14:hiddenLine xmlns:a14="http://schemas.microsoft.com/office/drawing/2010/main" xmlns="" w="9525">
+                <a14:hiddenLine xmlns="" xmlns:a14="http://schemas.microsoft.com/office/drawing/2010/main" w="9525">
                   <a:solidFill>
                     <a:srgbClr val="000000"/>
                   </a:solidFill>
@@ -1107,7 +1107,7 @@
             </a:ln>
             <a:extLst>
               <a:ext uri="{91240B29-F687-4f45-9708-019B960494DF}">
-                <a14:hiddenLine xmlns:a14="http://schemas.microsoft.com/office/drawing/2010/main" xmlns="" w="9525">
+                <a14:hiddenLine xmlns="" xmlns:a14="http://schemas.microsoft.com/office/drawing/2010/main" w="9525">
                   <a:solidFill>
                     <a:srgbClr val="000000"/>
                   </a:solidFill>
@@ -1217,7 +1217,7 @@
             </a:ln>
             <a:extLst>
               <a:ext uri="{91240B29-F687-4f45-9708-019B960494DF}">
-                <a14:hiddenLine xmlns:a14="http://schemas.microsoft.com/office/drawing/2010/main" xmlns="" w="9525">
+                <a14:hiddenLine xmlns="" xmlns:a14="http://schemas.microsoft.com/office/drawing/2010/main" w="9525">
                   <a:solidFill>
                     <a:srgbClr val="000000"/>
                   </a:solidFill>
@@ -1279,7 +1279,7 @@
             </a:ln>
             <a:extLst>
               <a:ext uri="{91240B29-F687-4f45-9708-019B960494DF}">
-                <a14:hiddenLine xmlns:a14="http://schemas.microsoft.com/office/drawing/2010/main" xmlns="" w="9525">
+                <a14:hiddenLine xmlns="" xmlns:a14="http://schemas.microsoft.com/office/drawing/2010/main" w="9525">
                   <a:solidFill>
                     <a:srgbClr val="000000"/>
                   </a:solidFill>
@@ -1369,7 +1369,7 @@
             </a:ln>
             <a:extLst>
               <a:ext uri="{91240B29-F687-4f45-9708-019B960494DF}">
-                <a14:hiddenLine xmlns:a14="http://schemas.microsoft.com/office/drawing/2010/main" xmlns="" w="9525">
+                <a14:hiddenLine xmlns="" xmlns:a14="http://schemas.microsoft.com/office/drawing/2010/main" w="9525">
                   <a:solidFill>
                     <a:srgbClr val="000000"/>
                   </a:solidFill>
@@ -1459,7 +1459,7 @@
             </a:ln>
             <a:extLst>
               <a:ext uri="{91240B29-F687-4f45-9708-019B960494DF}">
-                <a14:hiddenLine xmlns:a14="http://schemas.microsoft.com/office/drawing/2010/main" xmlns="" w="9525">
+                <a14:hiddenLine xmlns="" xmlns:a14="http://schemas.microsoft.com/office/drawing/2010/main" w="9525">
                   <a:solidFill>
                     <a:srgbClr val="000000"/>
                   </a:solidFill>
@@ -1521,7 +1521,7 @@
             </a:ln>
             <a:extLst>
               <a:ext uri="{91240B29-F687-4f45-9708-019B960494DF}">
-                <a14:hiddenLine xmlns:a14="http://schemas.microsoft.com/office/drawing/2010/main" xmlns="" w="9525">
+                <a14:hiddenLine xmlns="" xmlns:a14="http://schemas.microsoft.com/office/drawing/2010/main" w="9525">
                   <a:solidFill>
                     <a:srgbClr val="000000"/>
                   </a:solidFill>
@@ -1611,7 +1611,7 @@
             </a:ln>
             <a:extLst>
               <a:ext uri="{91240B29-F687-4f45-9708-019B960494DF}">
-                <a14:hiddenLine xmlns:a14="http://schemas.microsoft.com/office/drawing/2010/main" xmlns="" w="9525">
+                <a14:hiddenLine xmlns="" xmlns:a14="http://schemas.microsoft.com/office/drawing/2010/main" w="9525">
                   <a:solidFill>
                     <a:srgbClr val="000000"/>
                   </a:solidFill>
@@ -1701,7 +1701,7 @@
             </a:ln>
             <a:extLst>
               <a:ext uri="{91240B29-F687-4f45-9708-019B960494DF}">
-                <a14:hiddenLine xmlns:a14="http://schemas.microsoft.com/office/drawing/2010/main" xmlns="" w="9525">
+                <a14:hiddenLine xmlns="" xmlns:a14="http://schemas.microsoft.com/office/drawing/2010/main" w="9525">
                   <a:solidFill>
                     <a:srgbClr val="000000"/>
                   </a:solidFill>
@@ -1757,7 +1757,7 @@
             </a:ln>
             <a:extLst>
               <a:ext uri="{91240B29-F687-4f45-9708-019B960494DF}">
-                <a14:hiddenLine xmlns:a14="http://schemas.microsoft.com/office/drawing/2010/main" xmlns="" w="9525">
+                <a14:hiddenLine xmlns="" xmlns:a14="http://schemas.microsoft.com/office/drawing/2010/main" w="9525">
                   <a:solidFill>
                     <a:srgbClr val="000000"/>
                   </a:solidFill>
@@ -1847,7 +1847,7 @@
             </a:ln>
             <a:extLst>
               <a:ext uri="{91240B29-F687-4f45-9708-019B960494DF}">
-                <a14:hiddenLine xmlns:a14="http://schemas.microsoft.com/office/drawing/2010/main" xmlns="" w="9525">
+                <a14:hiddenLine xmlns="" xmlns:a14="http://schemas.microsoft.com/office/drawing/2010/main" w="9525">
                   <a:solidFill>
                     <a:srgbClr val="000000"/>
                   </a:solidFill>
@@ -1903,7 +1903,7 @@
             </a:ln>
             <a:extLst>
               <a:ext uri="{91240B29-F687-4f45-9708-019B960494DF}">
-                <a14:hiddenLine xmlns:a14="http://schemas.microsoft.com/office/drawing/2010/main" xmlns="" w="9525">
+                <a14:hiddenLine xmlns="" xmlns:a14="http://schemas.microsoft.com/office/drawing/2010/main" w="9525">
                   <a:solidFill>
                     <a:srgbClr val="000000"/>
                   </a:solidFill>
@@ -1993,7 +1993,7 @@
             </a:ln>
             <a:extLst>
               <a:ext uri="{91240B29-F687-4f45-9708-019B960494DF}">
-                <a14:hiddenLine xmlns:a14="http://schemas.microsoft.com/office/drawing/2010/main" xmlns="" w="9525">
+                <a14:hiddenLine xmlns="" xmlns:a14="http://schemas.microsoft.com/office/drawing/2010/main" w="9525">
                   <a:solidFill>
                     <a:srgbClr val="000000"/>
                   </a:solidFill>
@@ -2061,7 +2061,7 @@
             </a:ln>
             <a:extLst>
               <a:ext uri="{91240B29-F687-4f45-9708-019B960494DF}">
-                <a14:hiddenLine xmlns:a14="http://schemas.microsoft.com/office/drawing/2010/main" xmlns="" w="9525">
+                <a14:hiddenLine xmlns="" xmlns:a14="http://schemas.microsoft.com/office/drawing/2010/main" w="9525">
                   <a:solidFill>
                     <a:srgbClr val="000000"/>
                   </a:solidFill>
@@ -2151,7 +2151,7 @@
             </a:ln>
             <a:extLst>
               <a:ext uri="{91240B29-F687-4f45-9708-019B960494DF}">
-                <a14:hiddenLine xmlns:a14="http://schemas.microsoft.com/office/drawing/2010/main" xmlns="" w="9525">
+                <a14:hiddenLine xmlns="" xmlns:a14="http://schemas.microsoft.com/office/drawing/2010/main" w="9525">
                   <a:solidFill>
                     <a:srgbClr val="000000"/>
                   </a:solidFill>
@@ -2219,7 +2219,7 @@
             </a:ln>
             <a:extLst>
               <a:ext uri="{91240B29-F687-4f45-9708-019B960494DF}">
-                <a14:hiddenLine xmlns:a14="http://schemas.microsoft.com/office/drawing/2010/main" xmlns="" w="9525">
+                <a14:hiddenLine xmlns="" xmlns:a14="http://schemas.microsoft.com/office/drawing/2010/main" w="9525">
                   <a:solidFill>
                     <a:srgbClr val="000000"/>
                   </a:solidFill>
@@ -2309,7 +2309,7 @@
             </a:ln>
             <a:extLst>
               <a:ext uri="{91240B29-F687-4f45-9708-019B960494DF}">
-                <a14:hiddenLine xmlns:a14="http://schemas.microsoft.com/office/drawing/2010/main" xmlns="" w="9525">
+                <a14:hiddenLine xmlns="" xmlns:a14="http://schemas.microsoft.com/office/drawing/2010/main" w="9525">
                   <a:solidFill>
                     <a:srgbClr val="000000"/>
                   </a:solidFill>
@@ -2343,7 +2343,7 @@
             </a:ln>
             <a:extLst>
               <a:ext uri="{91240B29-F687-4f45-9708-019B960494DF}">
-                <a14:hiddenLine xmlns:a14="http://schemas.microsoft.com/office/drawing/2010/main" xmlns="" w="9525">
+                <a14:hiddenLine xmlns="" xmlns:a14="http://schemas.microsoft.com/office/drawing/2010/main" w="9525">
                   <a:solidFill>
                     <a:srgbClr val="000000"/>
                   </a:solidFill>
@@ -2433,7 +2433,7 @@
             </a:ln>
             <a:extLst>
               <a:ext uri="{91240B29-F687-4f45-9708-019B960494DF}">
-                <a14:hiddenLine xmlns:a14="http://schemas.microsoft.com/office/drawing/2010/main" xmlns="" w="9525">
+                <a14:hiddenLine xmlns="" xmlns:a14="http://schemas.microsoft.com/office/drawing/2010/main" w="9525">
                   <a:solidFill>
                     <a:srgbClr val="000000"/>
                   </a:solidFill>
@@ -2495,7 +2495,7 @@
             </a:ln>
             <a:extLst>
               <a:ext uri="{91240B29-F687-4f45-9708-019B960494DF}">
-                <a14:hiddenLine xmlns:a14="http://schemas.microsoft.com/office/drawing/2010/main" xmlns="" w="9525">
+                <a14:hiddenLine xmlns="" xmlns:a14="http://schemas.microsoft.com/office/drawing/2010/main" w="9525">
                   <a:solidFill>
                     <a:srgbClr val="000000"/>
                   </a:solidFill>
@@ -2557,7 +2557,7 @@
             </a:ln>
             <a:extLst>
               <a:ext uri="{91240B29-F687-4f45-9708-019B960494DF}">
-                <a14:hiddenLine xmlns:a14="http://schemas.microsoft.com/office/drawing/2010/main" xmlns="" w="9525">
+                <a14:hiddenLine xmlns="" xmlns:a14="http://schemas.microsoft.com/office/drawing/2010/main" w="9525">
                   <a:solidFill>
                     <a:srgbClr val="000000"/>
                   </a:solidFill>
@@ -2647,7 +2647,7 @@
             </a:ln>
             <a:extLst>
               <a:ext uri="{91240B29-F687-4f45-9708-019B960494DF}">
-                <a14:hiddenLine xmlns:a14="http://schemas.microsoft.com/office/drawing/2010/main" xmlns="" w="9525">
+                <a14:hiddenLine xmlns="" xmlns:a14="http://schemas.microsoft.com/office/drawing/2010/main" w="9525">
                   <a:solidFill>
                     <a:srgbClr val="000000"/>
                   </a:solidFill>
@@ -2715,7 +2715,7 @@
             </a:ln>
             <a:extLst>
               <a:ext uri="{91240B29-F687-4f45-9708-019B960494DF}">
-                <a14:hiddenLine xmlns:a14="http://schemas.microsoft.com/office/drawing/2010/main" xmlns="" w="9525">
+                <a14:hiddenLine xmlns="" xmlns:a14="http://schemas.microsoft.com/office/drawing/2010/main" w="9525">
                   <a:solidFill>
                     <a:srgbClr val="000000"/>
                   </a:solidFill>
@@ -2777,7 +2777,7 @@
             </a:ln>
             <a:extLst>
               <a:ext uri="{91240B29-F687-4f45-9708-019B960494DF}">
-                <a14:hiddenLine xmlns:a14="http://schemas.microsoft.com/office/drawing/2010/main" xmlns="" w="9525">
+                <a14:hiddenLine xmlns="" xmlns:a14="http://schemas.microsoft.com/office/drawing/2010/main" w="9525">
                   <a:solidFill>
                     <a:srgbClr val="000000"/>
                   </a:solidFill>
@@ -2867,7 +2867,7 @@
             </a:ln>
             <a:extLst>
               <a:ext uri="{91240B29-F687-4f45-9708-019B960494DF}">
-                <a14:hiddenLine xmlns:a14="http://schemas.microsoft.com/office/drawing/2010/main" xmlns="" w="9525">
+                <a14:hiddenLine xmlns="" xmlns:a14="http://schemas.microsoft.com/office/drawing/2010/main" w="9525">
                   <a:solidFill>
                     <a:srgbClr val="000000"/>
                   </a:solidFill>
@@ -2929,7 +2929,7 @@
             </a:ln>
             <a:extLst>
               <a:ext uri="{91240B29-F687-4f45-9708-019B960494DF}">
-                <a14:hiddenLine xmlns:a14="http://schemas.microsoft.com/office/drawing/2010/main" xmlns="" w="9525">
+                <a14:hiddenLine xmlns="" xmlns:a14="http://schemas.microsoft.com/office/drawing/2010/main" w="9525">
                   <a:solidFill>
                     <a:srgbClr val="000000"/>
                   </a:solidFill>
@@ -3019,7 +3019,7 @@
             </a:ln>
             <a:extLst>
               <a:ext uri="{91240B29-F687-4f45-9708-019B960494DF}">
-                <a14:hiddenLine xmlns:a14="http://schemas.microsoft.com/office/drawing/2010/main" xmlns="" w="9525">
+                <a14:hiddenLine xmlns="" xmlns:a14="http://schemas.microsoft.com/office/drawing/2010/main" w="9525">
                   <a:solidFill>
                     <a:srgbClr val="000000"/>
                   </a:solidFill>
@@ -3081,7 +3081,7 @@
             </a:ln>
             <a:extLst>
               <a:ext uri="{91240B29-F687-4f45-9708-019B960494DF}">
-                <a14:hiddenLine xmlns:a14="http://schemas.microsoft.com/office/drawing/2010/main" xmlns="" w="9525">
+                <a14:hiddenLine xmlns="" xmlns:a14="http://schemas.microsoft.com/office/drawing/2010/main" w="9525">
                   <a:solidFill>
                     <a:srgbClr val="000000"/>
                   </a:solidFill>
@@ -3171,7 +3171,7 @@
             </a:ln>
             <a:extLst>
               <a:ext uri="{91240B29-F687-4f45-9708-019B960494DF}">
-                <a14:hiddenLine xmlns:a14="http://schemas.microsoft.com/office/drawing/2010/main" xmlns="" w="9525">
+                <a14:hiddenLine xmlns="" xmlns:a14="http://schemas.microsoft.com/office/drawing/2010/main" w="9525">
                   <a:solidFill>
                     <a:srgbClr val="000000"/>
                   </a:solidFill>
@@ -3205,7 +3205,7 @@
             </a:ln>
             <a:extLst>
               <a:ext uri="{91240B29-F687-4f45-9708-019B960494DF}">
-                <a14:hiddenLine xmlns:a14="http://schemas.microsoft.com/office/drawing/2010/main" xmlns="" w="9525">
+                <a14:hiddenLine xmlns="" xmlns:a14="http://schemas.microsoft.com/office/drawing/2010/main" w="9525">
                   <a:solidFill>
                     <a:srgbClr val="000000"/>
                   </a:solidFill>
@@ -3270,7 +3270,7 @@
             </a:ln>
             <a:extLst>
               <a:ext uri="{91240B29-F687-4f45-9708-019B960494DF}">
-                <a14:hiddenLine xmlns:a14="http://schemas.microsoft.com/office/drawing/2010/main" xmlns="" w="9525">
+                <a14:hiddenLine xmlns="" xmlns:a14="http://schemas.microsoft.com/office/drawing/2010/main" w="9525">
                   <a:solidFill>
                     <a:srgbClr val="000000"/>
                   </a:solidFill>
@@ -3360,7 +3360,7 @@
             </a:ln>
             <a:extLst>
               <a:ext uri="{91240B29-F687-4f45-9708-019B960494DF}">
-                <a14:hiddenLine xmlns:a14="http://schemas.microsoft.com/office/drawing/2010/main" xmlns="" w="9525">
+                <a14:hiddenLine xmlns="" xmlns:a14="http://schemas.microsoft.com/office/drawing/2010/main" w="9525">
                   <a:solidFill>
                     <a:srgbClr val="000000"/>
                   </a:solidFill>
@@ -3422,7 +3422,7 @@
             </a:ln>
             <a:extLst>
               <a:ext uri="{91240B29-F687-4f45-9708-019B960494DF}">
-                <a14:hiddenLine xmlns:a14="http://schemas.microsoft.com/office/drawing/2010/main" xmlns="" w="9525">
+                <a14:hiddenLine xmlns="" xmlns:a14="http://schemas.microsoft.com/office/drawing/2010/main" w="9525">
                   <a:solidFill>
                     <a:srgbClr val="000000"/>
                   </a:solidFill>
@@ -3512,7 +3512,7 @@
             </a:ln>
             <a:extLst>
               <a:ext uri="{91240B29-F687-4f45-9708-019B960494DF}">
-                <a14:hiddenLine xmlns:a14="http://schemas.microsoft.com/office/drawing/2010/main" xmlns="" w="9525">
+                <a14:hiddenLine xmlns="" xmlns:a14="http://schemas.microsoft.com/office/drawing/2010/main" w="9525">
                   <a:solidFill>
                     <a:srgbClr val="000000"/>
                   </a:solidFill>
@@ -3602,7 +3602,7 @@
             </a:ln>
             <a:extLst>
               <a:ext uri="{91240B29-F687-4f45-9708-019B960494DF}">
-                <a14:hiddenLine xmlns:a14="http://schemas.microsoft.com/office/drawing/2010/main" xmlns="" w="9525">
+                <a14:hiddenLine xmlns="" xmlns:a14="http://schemas.microsoft.com/office/drawing/2010/main" w="9525">
                   <a:solidFill>
                     <a:srgbClr val="000000"/>
                   </a:solidFill>
@@ -3667,7 +3667,7 @@
             </a:ln>
             <a:extLst>
               <a:ext uri="{91240B29-F687-4f45-9708-019B960494DF}">
-                <a14:hiddenLine xmlns:a14="http://schemas.microsoft.com/office/drawing/2010/main" xmlns="" w="9525">
+                <a14:hiddenLine xmlns="" xmlns:a14="http://schemas.microsoft.com/office/drawing/2010/main" w="9525">
                   <a:solidFill>
                     <a:srgbClr val="000000"/>
                   </a:solidFill>
@@ -3729,7 +3729,7 @@
             </a:ln>
             <a:extLst>
               <a:ext uri="{91240B29-F687-4f45-9708-019B960494DF}">
-                <a14:hiddenLine xmlns:a14="http://schemas.microsoft.com/office/drawing/2010/main" xmlns="" w="9525">
+                <a14:hiddenLine xmlns="" xmlns:a14="http://schemas.microsoft.com/office/drawing/2010/main" w="9525">
                   <a:solidFill>
                     <a:srgbClr val="000000"/>
                   </a:solidFill>
@@ -3819,7 +3819,7 @@
             </a:ln>
             <a:extLst>
               <a:ext uri="{91240B29-F687-4f45-9708-019B960494DF}">
-                <a14:hiddenLine xmlns:a14="http://schemas.microsoft.com/office/drawing/2010/main" xmlns="" w="9525">
+                <a14:hiddenLine xmlns="" xmlns:a14="http://schemas.microsoft.com/office/drawing/2010/main" w="9525">
                   <a:solidFill>
                     <a:srgbClr val="000000"/>
                   </a:solidFill>
@@ -3909,7 +3909,7 @@
             </a:ln>
             <a:extLst>
               <a:ext uri="{91240B29-F687-4f45-9708-019B960494DF}">
-                <a14:hiddenLine xmlns:a14="http://schemas.microsoft.com/office/drawing/2010/main" xmlns="" w="9525">
+                <a14:hiddenLine xmlns="" xmlns:a14="http://schemas.microsoft.com/office/drawing/2010/main" w="9525">
                   <a:solidFill>
                     <a:srgbClr val="000000"/>
                   </a:solidFill>
@@ -3971,7 +3971,7 @@
             </a:ln>
             <a:extLst>
               <a:ext uri="{91240B29-F687-4f45-9708-019B960494DF}">
-                <a14:hiddenLine xmlns:a14="http://schemas.microsoft.com/office/drawing/2010/main" xmlns="" w="9525">
+                <a14:hiddenLine xmlns="" xmlns:a14="http://schemas.microsoft.com/office/drawing/2010/main" w="9525">
                   <a:solidFill>
                     <a:srgbClr val="000000"/>
                   </a:solidFill>
@@ -4091,7 +4091,7 @@
             </a:ln>
             <a:extLst>
               <a:ext uri="{91240B29-F687-4f45-9708-019B960494DF}">
-                <a14:hiddenLine xmlns:a14="http://schemas.microsoft.com/office/drawing/2010/main" xmlns="" w="9525">
+                <a14:hiddenLine xmlns="" xmlns:a14="http://schemas.microsoft.com/office/drawing/2010/main" w="9525">
                   <a:solidFill>
                     <a:srgbClr val="000000"/>
                   </a:solidFill>
@@ -4159,7 +4159,7 @@
             </a:ln>
             <a:extLst>
               <a:ext uri="{91240B29-F687-4f45-9708-019B960494DF}">
-                <a14:hiddenLine xmlns:a14="http://schemas.microsoft.com/office/drawing/2010/main" xmlns="" w="9525">
+                <a14:hiddenLine xmlns="" xmlns:a14="http://schemas.microsoft.com/office/drawing/2010/main" w="9525">
                   <a:solidFill>
                     <a:srgbClr val="000000"/>
                   </a:solidFill>
@@ -4249,7 +4249,7 @@
             </a:ln>
             <a:extLst>
               <a:ext uri="{91240B29-F687-4f45-9708-019B960494DF}">
-                <a14:hiddenLine xmlns:a14="http://schemas.microsoft.com/office/drawing/2010/main" xmlns="" w="9525">
+                <a14:hiddenLine xmlns="" xmlns:a14="http://schemas.microsoft.com/office/drawing/2010/main" w="9525">
                   <a:solidFill>
                     <a:srgbClr val="000000"/>
                   </a:solidFill>
@@ -9056,7 +9056,7 @@
           <a:noFill/>
           <a:extLst>
             <a:ext uri="{909E8E84-426E-40dd-AFC4-6F175D3DCCD1}">
-              <a14:hiddenFill xmlns:a14="http://schemas.microsoft.com/office/drawing/2010/main" xmlns="">
+              <a14:hiddenFill xmlns="" xmlns:a14="http://schemas.microsoft.com/office/drawing/2010/main">
                 <a:solidFill>
                   <a:srgbClr val="FFFFFF"/>
                 </a:solidFill>
@@ -9130,7 +9130,7 @@
               </a:ln>
               <a:extLst>
                 <a:ext uri="{91240B29-F687-4f45-9708-019B960494DF}">
-                  <a14:hiddenLine xmlns:a14="http://schemas.microsoft.com/office/drawing/2010/main" xmlns="" w="9525">
+                  <a14:hiddenLine xmlns="" xmlns:a14="http://schemas.microsoft.com/office/drawing/2010/main" w="9525">
                     <a:solidFill>
                       <a:srgbClr val="000000"/>
                     </a:solidFill>
@@ -9220,7 +9220,7 @@
               </a:ln>
               <a:extLst>
                 <a:ext uri="{91240B29-F687-4f45-9708-019B960494DF}">
-                  <a14:hiddenLine xmlns:a14="http://schemas.microsoft.com/office/drawing/2010/main" xmlns="" w="9525">
+                  <a14:hiddenLine xmlns="" xmlns:a14="http://schemas.microsoft.com/office/drawing/2010/main" w="9525">
                     <a:solidFill>
                       <a:srgbClr val="000000"/>
                     </a:solidFill>
@@ -9310,7 +9310,7 @@
               </a:ln>
               <a:extLst>
                 <a:ext uri="{91240B29-F687-4f45-9708-019B960494DF}">
-                  <a14:hiddenLine xmlns:a14="http://schemas.microsoft.com/office/drawing/2010/main" xmlns="" w="9525">
+                  <a14:hiddenLine xmlns="" xmlns:a14="http://schemas.microsoft.com/office/drawing/2010/main" w="9525">
                     <a:solidFill>
                       <a:srgbClr val="000000"/>
                     </a:solidFill>
@@ -9372,7 +9372,7 @@
               </a:ln>
               <a:extLst>
                 <a:ext uri="{91240B29-F687-4f45-9708-019B960494DF}">
-                  <a14:hiddenLine xmlns:a14="http://schemas.microsoft.com/office/drawing/2010/main" xmlns="" w="9525">
+                  <a14:hiddenLine xmlns="" xmlns:a14="http://schemas.microsoft.com/office/drawing/2010/main" w="9525">
                     <a:solidFill>
                       <a:srgbClr val="000000"/>
                     </a:solidFill>
@@ -9462,7 +9462,7 @@
               </a:ln>
               <a:extLst>
                 <a:ext uri="{91240B29-F687-4f45-9708-019B960494DF}">
-                  <a14:hiddenLine xmlns:a14="http://schemas.microsoft.com/office/drawing/2010/main" xmlns="" w="9525">
+                  <a14:hiddenLine xmlns="" xmlns:a14="http://schemas.microsoft.com/office/drawing/2010/main" w="9525">
                     <a:solidFill>
                       <a:srgbClr val="000000"/>
                     </a:solidFill>
@@ -9524,7 +9524,7 @@
               </a:ln>
               <a:extLst>
                 <a:ext uri="{91240B29-F687-4f45-9708-019B960494DF}">
-                  <a14:hiddenLine xmlns:a14="http://schemas.microsoft.com/office/drawing/2010/main" xmlns="" w="9525">
+                  <a14:hiddenLine xmlns="" xmlns:a14="http://schemas.microsoft.com/office/drawing/2010/main" w="9525">
                     <a:solidFill>
                       <a:srgbClr val="000000"/>
                     </a:solidFill>
@@ -9586,7 +9586,7 @@
               </a:ln>
               <a:extLst>
                 <a:ext uri="{91240B29-F687-4f45-9708-019B960494DF}">
-                  <a14:hiddenLine xmlns:a14="http://schemas.microsoft.com/office/drawing/2010/main" xmlns="" w="9525">
+                  <a14:hiddenLine xmlns="" xmlns:a14="http://schemas.microsoft.com/office/drawing/2010/main" w="9525">
                     <a:solidFill>
                       <a:srgbClr val="000000"/>
                     </a:solidFill>
@@ -9676,7 +9676,7 @@
               </a:ln>
               <a:extLst>
                 <a:ext uri="{91240B29-F687-4f45-9708-019B960494DF}">
-                  <a14:hiddenLine xmlns:a14="http://schemas.microsoft.com/office/drawing/2010/main" xmlns="" w="9525">
+                  <a14:hiddenLine xmlns="" xmlns:a14="http://schemas.microsoft.com/office/drawing/2010/main" w="9525">
                     <a:solidFill>
                       <a:srgbClr val="000000"/>
                     </a:solidFill>
@@ -9766,7 +9766,7 @@
               </a:ln>
               <a:extLst>
                 <a:ext uri="{91240B29-F687-4f45-9708-019B960494DF}">
-                  <a14:hiddenLine xmlns:a14="http://schemas.microsoft.com/office/drawing/2010/main" xmlns="" w="9525">
+                  <a14:hiddenLine xmlns="" xmlns:a14="http://schemas.microsoft.com/office/drawing/2010/main" w="9525">
                     <a:solidFill>
                       <a:srgbClr val="000000"/>
                     </a:solidFill>
@@ -9828,7 +9828,7 @@
               </a:ln>
               <a:extLst>
                 <a:ext uri="{91240B29-F687-4f45-9708-019B960494DF}">
-                  <a14:hiddenLine xmlns:a14="http://schemas.microsoft.com/office/drawing/2010/main" xmlns="" w="9525">
+                  <a14:hiddenLine xmlns="" xmlns:a14="http://schemas.microsoft.com/office/drawing/2010/main" w="9525">
                     <a:solidFill>
                       <a:srgbClr val="000000"/>
                     </a:solidFill>
@@ -9938,7 +9938,7 @@
               </a:ln>
               <a:extLst>
                 <a:ext uri="{91240B29-F687-4f45-9708-019B960494DF}">
-                  <a14:hiddenLine xmlns:a14="http://schemas.microsoft.com/office/drawing/2010/main" xmlns="" w="9525">
+                  <a14:hiddenLine xmlns="" xmlns:a14="http://schemas.microsoft.com/office/drawing/2010/main" w="9525">
                     <a:solidFill>
                       <a:srgbClr val="000000"/>
                     </a:solidFill>
@@ -10022,7 +10022,7 @@
               </a:ln>
               <a:extLst>
                 <a:ext uri="{91240B29-F687-4f45-9708-019B960494DF}">
-                  <a14:hiddenLine xmlns:a14="http://schemas.microsoft.com/office/drawing/2010/main" xmlns="" w="9525">
+                  <a14:hiddenLine xmlns="" xmlns:a14="http://schemas.microsoft.com/office/drawing/2010/main" w="9525">
                     <a:solidFill>
                       <a:srgbClr val="000000"/>
                     </a:solidFill>
@@ -10084,7 +10084,7 @@
               </a:ln>
               <a:extLst>
                 <a:ext uri="{91240B29-F687-4f45-9708-019B960494DF}">
-                  <a14:hiddenLine xmlns:a14="http://schemas.microsoft.com/office/drawing/2010/main" xmlns="" w="9525">
+                  <a14:hiddenLine xmlns="" xmlns:a14="http://schemas.microsoft.com/office/drawing/2010/main" w="9525">
                     <a:solidFill>
                       <a:srgbClr val="000000"/>
                     </a:solidFill>
@@ -10146,7 +10146,7 @@
               </a:ln>
               <a:extLst>
                 <a:ext uri="{91240B29-F687-4f45-9708-019B960494DF}">
-                  <a14:hiddenLine xmlns:a14="http://schemas.microsoft.com/office/drawing/2010/main" xmlns="" w="9525">
+                  <a14:hiddenLine xmlns="" xmlns:a14="http://schemas.microsoft.com/office/drawing/2010/main" w="9525">
                     <a:solidFill>
                       <a:srgbClr val="000000"/>
                     </a:solidFill>
@@ -10236,7 +10236,7 @@
               </a:ln>
               <a:extLst>
                 <a:ext uri="{91240B29-F687-4f45-9708-019B960494DF}">
-                  <a14:hiddenLine xmlns:a14="http://schemas.microsoft.com/office/drawing/2010/main" xmlns="" w="9525">
+                  <a14:hiddenLine xmlns="" xmlns:a14="http://schemas.microsoft.com/office/drawing/2010/main" w="9525">
                     <a:solidFill>
                       <a:srgbClr val="000000"/>
                     </a:solidFill>
@@ -10270,7 +10270,7 @@
               </a:ln>
               <a:extLst>
                 <a:ext uri="{91240B29-F687-4f45-9708-019B960494DF}">
-                  <a14:hiddenLine xmlns:a14="http://schemas.microsoft.com/office/drawing/2010/main" xmlns="" w="9525">
+                  <a14:hiddenLine xmlns="" xmlns:a14="http://schemas.microsoft.com/office/drawing/2010/main" w="9525">
                     <a:solidFill>
                       <a:srgbClr val="000000"/>
                     </a:solidFill>
@@ -10335,7 +10335,7 @@
               </a:ln>
               <a:extLst>
                 <a:ext uri="{91240B29-F687-4f45-9708-019B960494DF}">
-                  <a14:hiddenLine xmlns:a14="http://schemas.microsoft.com/office/drawing/2010/main" xmlns="" w="9525">
+                  <a14:hiddenLine xmlns="" xmlns:a14="http://schemas.microsoft.com/office/drawing/2010/main" w="9525">
                     <a:solidFill>
                       <a:srgbClr val="000000"/>
                     </a:solidFill>
@@ -10425,7 +10425,7 @@
               </a:ln>
               <a:extLst>
                 <a:ext uri="{91240B29-F687-4f45-9708-019B960494DF}">
-                  <a14:hiddenLine xmlns:a14="http://schemas.microsoft.com/office/drawing/2010/main" xmlns="" w="9525">
+                  <a14:hiddenLine xmlns="" xmlns:a14="http://schemas.microsoft.com/office/drawing/2010/main" w="9525">
                     <a:solidFill>
                       <a:srgbClr val="000000"/>
                     </a:solidFill>
@@ -10487,7 +10487,7 @@
               </a:ln>
               <a:extLst>
                 <a:ext uri="{91240B29-F687-4f45-9708-019B960494DF}">
-                  <a14:hiddenLine xmlns:a14="http://schemas.microsoft.com/office/drawing/2010/main" xmlns="" w="9525">
+                  <a14:hiddenLine xmlns="" xmlns:a14="http://schemas.microsoft.com/office/drawing/2010/main" w="9525">
                     <a:solidFill>
                       <a:srgbClr val="000000"/>
                     </a:solidFill>
@@ -10577,7 +10577,7 @@
               </a:ln>
               <a:extLst>
                 <a:ext uri="{91240B29-F687-4f45-9708-019B960494DF}">
-                  <a14:hiddenLine xmlns:a14="http://schemas.microsoft.com/office/drawing/2010/main" xmlns="" w="9525">
+                  <a14:hiddenLine xmlns="" xmlns:a14="http://schemas.microsoft.com/office/drawing/2010/main" w="9525">
                     <a:solidFill>
                       <a:srgbClr val="000000"/>
                     </a:solidFill>
@@ -10642,7 +10642,7 @@
               </a:ln>
               <a:extLst>
                 <a:ext uri="{91240B29-F687-4f45-9708-019B960494DF}">
-                  <a14:hiddenLine xmlns:a14="http://schemas.microsoft.com/office/drawing/2010/main" xmlns="" w="9525">
+                  <a14:hiddenLine xmlns="" xmlns:a14="http://schemas.microsoft.com/office/drawing/2010/main" w="9525">
                     <a:solidFill>
                       <a:srgbClr val="000000"/>
                     </a:solidFill>
@@ -10704,7 +10704,7 @@
               </a:ln>
               <a:extLst>
                 <a:ext uri="{91240B29-F687-4f45-9708-019B960494DF}">
-                  <a14:hiddenLine xmlns:a14="http://schemas.microsoft.com/office/drawing/2010/main" xmlns="" w="9525">
+                  <a14:hiddenLine xmlns="" xmlns:a14="http://schemas.microsoft.com/office/drawing/2010/main" w="9525">
                     <a:solidFill>
                       <a:srgbClr val="000000"/>
                     </a:solidFill>
@@ -10794,7 +10794,7 @@
               </a:ln>
               <a:extLst>
                 <a:ext uri="{91240B29-F687-4f45-9708-019B960494DF}">
-                  <a14:hiddenLine xmlns:a14="http://schemas.microsoft.com/office/drawing/2010/main" xmlns="" w="9525">
+                  <a14:hiddenLine xmlns="" xmlns:a14="http://schemas.microsoft.com/office/drawing/2010/main" w="9525">
                     <a:solidFill>
                       <a:srgbClr val="000000"/>
                     </a:solidFill>
@@ -10884,7 +10884,7 @@
               </a:ln>
               <a:extLst>
                 <a:ext uri="{91240B29-F687-4f45-9708-019B960494DF}">
-                  <a14:hiddenLine xmlns:a14="http://schemas.microsoft.com/office/drawing/2010/main" xmlns="" w="9525">
+                  <a14:hiddenLine xmlns="" xmlns:a14="http://schemas.microsoft.com/office/drawing/2010/main" w="9525">
                     <a:solidFill>
                       <a:srgbClr val="000000"/>
                     </a:solidFill>
@@ -10949,7 +10949,7 @@
               </a:ln>
               <a:extLst>
                 <a:ext uri="{91240B29-F687-4f45-9708-019B960494DF}">
-                  <a14:hiddenLine xmlns:a14="http://schemas.microsoft.com/office/drawing/2010/main" xmlns="" w="9525">
+                  <a14:hiddenLine xmlns="" xmlns:a14="http://schemas.microsoft.com/office/drawing/2010/main" w="9525">
                     <a:solidFill>
                       <a:srgbClr val="000000"/>
                     </a:solidFill>
@@ -11069,7 +11069,7 @@
               </a:ln>
               <a:extLst>
                 <a:ext uri="{91240B29-F687-4f45-9708-019B960494DF}">
-                  <a14:hiddenLine xmlns:a14="http://schemas.microsoft.com/office/drawing/2010/main" xmlns="" w="9525">
+                  <a14:hiddenLine xmlns="" xmlns:a14="http://schemas.microsoft.com/office/drawing/2010/main" w="9525">
                     <a:solidFill>
                       <a:srgbClr val="000000"/>
                     </a:solidFill>
@@ -11167,7 +11167,7 @@
               </a:ln>
               <a:extLst>
                 <a:ext uri="{91240B29-F687-4f45-9708-019B960494DF}">
-                  <a14:hiddenLine xmlns:a14="http://schemas.microsoft.com/office/drawing/2010/main" xmlns="" w="9525">
+                  <a14:hiddenLine xmlns="" xmlns:a14="http://schemas.microsoft.com/office/drawing/2010/main" w="9525">
                     <a:solidFill>
                       <a:srgbClr val="000000"/>
                     </a:solidFill>
@@ -11282,7 +11282,7 @@
               </a:ln>
               <a:extLst>
                 <a:ext uri="{91240B29-F687-4f45-9708-019B960494DF}">
-                  <a14:hiddenLine xmlns:a14="http://schemas.microsoft.com/office/drawing/2010/main" xmlns="" w="9525">
+                  <a14:hiddenLine xmlns="" xmlns:a14="http://schemas.microsoft.com/office/drawing/2010/main" w="9525">
                     <a:solidFill>
                       <a:srgbClr val="000000"/>
                     </a:solidFill>
@@ -11372,7 +11372,7 @@
               </a:ln>
               <a:extLst>
                 <a:ext uri="{91240B29-F687-4f45-9708-019B960494DF}">
-                  <a14:hiddenLine xmlns:a14="http://schemas.microsoft.com/office/drawing/2010/main" xmlns="" w="9525">
+                  <a14:hiddenLine xmlns="" xmlns:a14="http://schemas.microsoft.com/office/drawing/2010/main" w="9525">
                     <a:solidFill>
                       <a:srgbClr val="000000"/>
                     </a:solidFill>
@@ -11437,7 +11437,7 @@
               </a:ln>
               <a:extLst>
                 <a:ext uri="{91240B29-F687-4f45-9708-019B960494DF}">
-                  <a14:hiddenLine xmlns:a14="http://schemas.microsoft.com/office/drawing/2010/main" xmlns="" w="9525">
+                  <a14:hiddenLine xmlns="" xmlns:a14="http://schemas.microsoft.com/office/drawing/2010/main" w="9525">
                     <a:solidFill>
                       <a:srgbClr val="000000"/>
                     </a:solidFill>
@@ -11527,7 +11527,7 @@
               </a:ln>
               <a:extLst>
                 <a:ext uri="{91240B29-F687-4f45-9708-019B960494DF}">
-                  <a14:hiddenLine xmlns:a14="http://schemas.microsoft.com/office/drawing/2010/main" xmlns="" w="9525">
+                  <a14:hiddenLine xmlns="" xmlns:a14="http://schemas.microsoft.com/office/drawing/2010/main" w="9525">
                     <a:solidFill>
                       <a:srgbClr val="000000"/>
                     </a:solidFill>
@@ -11595,7 +11595,7 @@
               </a:ln>
               <a:extLst>
                 <a:ext uri="{91240B29-F687-4f45-9708-019B960494DF}">
-                  <a14:hiddenLine xmlns:a14="http://schemas.microsoft.com/office/drawing/2010/main" xmlns="" w="9525">
+                  <a14:hiddenLine xmlns="" xmlns:a14="http://schemas.microsoft.com/office/drawing/2010/main" w="9525">
                     <a:solidFill>
                       <a:srgbClr val="000000"/>
                     </a:solidFill>
@@ -11685,7 +11685,7 @@
               </a:ln>
               <a:extLst>
                 <a:ext uri="{91240B29-F687-4f45-9708-019B960494DF}">
-                  <a14:hiddenLine xmlns:a14="http://schemas.microsoft.com/office/drawing/2010/main" xmlns="" w="9525">
+                  <a14:hiddenLine xmlns="" xmlns:a14="http://schemas.microsoft.com/office/drawing/2010/main" w="9525">
                     <a:solidFill>
                       <a:srgbClr val="000000"/>
                     </a:solidFill>
@@ -11753,7 +11753,7 @@
               </a:ln>
               <a:extLst>
                 <a:ext uri="{91240B29-F687-4f45-9708-019B960494DF}">
-                  <a14:hiddenLine xmlns:a14="http://schemas.microsoft.com/office/drawing/2010/main" xmlns="" w="9525">
+                  <a14:hiddenLine xmlns="" xmlns:a14="http://schemas.microsoft.com/office/drawing/2010/main" w="9525">
                     <a:solidFill>
                       <a:srgbClr val="000000"/>
                     </a:solidFill>
@@ -11843,7 +11843,7 @@
               </a:ln>
               <a:extLst>
                 <a:ext uri="{91240B29-F687-4f45-9708-019B960494DF}">
-                  <a14:hiddenLine xmlns:a14="http://schemas.microsoft.com/office/drawing/2010/main" xmlns="" w="9525">
+                  <a14:hiddenLine xmlns="" xmlns:a14="http://schemas.microsoft.com/office/drawing/2010/main" w="9525">
                     <a:solidFill>
                       <a:srgbClr val="000000"/>
                     </a:solidFill>
@@ -11877,7 +11877,7 @@
               </a:ln>
               <a:extLst>
                 <a:ext uri="{91240B29-F687-4f45-9708-019B960494DF}">
-                  <a14:hiddenLine xmlns:a14="http://schemas.microsoft.com/office/drawing/2010/main" xmlns="" w="9525">
+                  <a14:hiddenLine xmlns="" xmlns:a14="http://schemas.microsoft.com/office/drawing/2010/main" w="9525">
                     <a:solidFill>
                       <a:srgbClr val="000000"/>
                     </a:solidFill>
@@ -12477,7 +12477,19 @@
               <a:rPr lang="es-419" sz="3600" dirty="0">
                 <a:latin typeface="Amasis MT Pro Black" panose="020B0604020202020204" pitchFamily="18" charset="0"/>
               </a:rPr>
-              <a:t>Portafolio - Desarrollador Web</a:t>
+              <a:t>Portafolio – D	</a:t>
+            </a:r>
+            <a:r>
+              <a:rPr lang="es-419" sz="3600" dirty="0" err="1">
+                <a:latin typeface="Amasis MT Pro Black" panose="020B0604020202020204" pitchFamily="18" charset="0"/>
+              </a:rPr>
+              <a:t>esarrollador</a:t>
+            </a:r>
+            <a:r>
+              <a:rPr lang="es-419" sz="3600" dirty="0">
+                <a:latin typeface="Amasis MT Pro Black" panose="020B0604020202020204" pitchFamily="18" charset="0"/>
+              </a:rPr>
+              <a:t> Web</a:t>
             </a:r>
           </a:p>
           <a:p>

</xml_diff>